<commit_message>
1. add conflicts check in timetable 2. add more values into take table in order to test conflicts
</commit_message>
<xml_diff>
--- a/ER Diagram.pptx
+++ b/ER Diagram.pptx
@@ -243,7 +243,7 @@
           <a:p>
             <a:fld id="{7A6B5368-13CE-48DB-A0D7-7862C748779D}" type="datetimeFigureOut">
               <a:rPr lang="en-US" smtClean="0"/>
-              <a:t>4/1/2015</a:t>
+              <a:t>4/7/2015</a:t>
             </a:fld>
             <a:endParaRPr lang="en-US"/>
           </a:p>
@@ -413,7 +413,7 @@
           <a:p>
             <a:fld id="{7A6B5368-13CE-48DB-A0D7-7862C748779D}" type="datetimeFigureOut">
               <a:rPr lang="en-US" smtClean="0"/>
-              <a:t>4/1/2015</a:t>
+              <a:t>4/7/2015</a:t>
             </a:fld>
             <a:endParaRPr lang="en-US"/>
           </a:p>
@@ -593,7 +593,7 @@
           <a:p>
             <a:fld id="{7A6B5368-13CE-48DB-A0D7-7862C748779D}" type="datetimeFigureOut">
               <a:rPr lang="en-US" smtClean="0"/>
-              <a:t>4/1/2015</a:t>
+              <a:t>4/7/2015</a:t>
             </a:fld>
             <a:endParaRPr lang="en-US"/>
           </a:p>
@@ -763,7 +763,7 @@
           <a:p>
             <a:fld id="{7A6B5368-13CE-48DB-A0D7-7862C748779D}" type="datetimeFigureOut">
               <a:rPr lang="en-US" smtClean="0"/>
-              <a:t>4/1/2015</a:t>
+              <a:t>4/7/2015</a:t>
             </a:fld>
             <a:endParaRPr lang="en-US"/>
           </a:p>
@@ -1009,7 +1009,7 @@
           <a:p>
             <a:fld id="{7A6B5368-13CE-48DB-A0D7-7862C748779D}" type="datetimeFigureOut">
               <a:rPr lang="en-US" smtClean="0"/>
-              <a:t>4/1/2015</a:t>
+              <a:t>4/7/2015</a:t>
             </a:fld>
             <a:endParaRPr lang="en-US"/>
           </a:p>
@@ -1241,7 +1241,7 @@
           <a:p>
             <a:fld id="{7A6B5368-13CE-48DB-A0D7-7862C748779D}" type="datetimeFigureOut">
               <a:rPr lang="en-US" smtClean="0"/>
-              <a:t>4/1/2015</a:t>
+              <a:t>4/7/2015</a:t>
             </a:fld>
             <a:endParaRPr lang="en-US"/>
           </a:p>
@@ -1608,7 +1608,7 @@
           <a:p>
             <a:fld id="{7A6B5368-13CE-48DB-A0D7-7862C748779D}" type="datetimeFigureOut">
               <a:rPr lang="en-US" smtClean="0"/>
-              <a:t>4/1/2015</a:t>
+              <a:t>4/7/2015</a:t>
             </a:fld>
             <a:endParaRPr lang="en-US"/>
           </a:p>
@@ -1726,7 +1726,7 @@
           <a:p>
             <a:fld id="{7A6B5368-13CE-48DB-A0D7-7862C748779D}" type="datetimeFigureOut">
               <a:rPr lang="en-US" smtClean="0"/>
-              <a:t>4/1/2015</a:t>
+              <a:t>4/7/2015</a:t>
             </a:fld>
             <a:endParaRPr lang="en-US"/>
           </a:p>
@@ -1821,7 +1821,7 @@
           <a:p>
             <a:fld id="{7A6B5368-13CE-48DB-A0D7-7862C748779D}" type="datetimeFigureOut">
               <a:rPr lang="en-US" smtClean="0"/>
-              <a:t>4/1/2015</a:t>
+              <a:t>4/7/2015</a:t>
             </a:fld>
             <a:endParaRPr lang="en-US"/>
           </a:p>
@@ -2098,7 +2098,7 @@
           <a:p>
             <a:fld id="{7A6B5368-13CE-48DB-A0D7-7862C748779D}" type="datetimeFigureOut">
               <a:rPr lang="en-US" smtClean="0"/>
-              <a:t>4/1/2015</a:t>
+              <a:t>4/7/2015</a:t>
             </a:fld>
             <a:endParaRPr lang="en-US"/>
           </a:p>
@@ -2351,7 +2351,7 @@
           <a:p>
             <a:fld id="{7A6B5368-13CE-48DB-A0D7-7862C748779D}" type="datetimeFigureOut">
               <a:rPr lang="en-US" smtClean="0"/>
-              <a:t>4/1/2015</a:t>
+              <a:t>4/7/2015</a:t>
             </a:fld>
             <a:endParaRPr lang="en-US"/>
           </a:p>
@@ -2564,7 +2564,7 @@
           <a:p>
             <a:fld id="{7A6B5368-13CE-48DB-A0D7-7862C748779D}" type="datetimeFigureOut">
               <a:rPr lang="en-US" smtClean="0"/>
-              <a:t>4/1/2015</a:t>
+              <a:t>4/7/2015</a:t>
             </a:fld>
             <a:endParaRPr lang="en-US"/>
           </a:p>
@@ -6027,6 +6027,119 @@
           </a:p>
         </p:txBody>
       </p:sp>
+      <p:sp>
+        <p:nvSpPr>
+          <p:cNvPr id="89" name="Oval 88"/>
+          <p:cNvSpPr/>
+          <p:nvPr/>
+        </p:nvSpPr>
+        <p:spPr>
+          <a:xfrm>
+            <a:off x="6518925" y="5455122"/>
+            <a:ext cx="258793" cy="258793"/>
+          </a:xfrm>
+          <a:prstGeom prst="ellipse">
+            <a:avLst/>
+          </a:prstGeom>
+          <a:noFill/>
+          <a:ln w="28575">
+            <a:solidFill>
+              <a:schemeClr val="tx1"/>
+            </a:solidFill>
+          </a:ln>
+        </p:spPr>
+        <p:style>
+          <a:lnRef idx="2">
+            <a:schemeClr val="accent1">
+              <a:shade val="50000"/>
+            </a:schemeClr>
+          </a:lnRef>
+          <a:fillRef idx="1">
+            <a:schemeClr val="accent1"/>
+          </a:fillRef>
+          <a:effectRef idx="0">
+            <a:schemeClr val="accent1"/>
+          </a:effectRef>
+          <a:fontRef idx="minor">
+            <a:schemeClr val="lt1"/>
+          </a:fontRef>
+        </p:style>
+        <p:txBody>
+          <a:bodyPr rtlCol="0" anchor="ctr"/>
+          <a:lstStyle/>
+          <a:p>
+            <a:pPr algn="ctr"/>
+            <a:endParaRPr lang="en-US"/>
+          </a:p>
+        </p:txBody>
+      </p:sp>
+      <p:cxnSp>
+        <p:nvCxnSpPr>
+          <p:cNvPr id="90" name="Straight Connector 89"/>
+          <p:cNvCxnSpPr>
+            <a:endCxn id="89" idx="2"/>
+          </p:cNvCxnSpPr>
+          <p:nvPr/>
+        </p:nvCxnSpPr>
+        <p:spPr>
+          <a:xfrm flipV="1">
+            <a:off x="6187054" y="5584519"/>
+            <a:ext cx="331871" cy="1363"/>
+          </a:xfrm>
+          <a:prstGeom prst="line">
+            <a:avLst/>
+          </a:prstGeom>
+          <a:ln w="28575">
+            <a:solidFill>
+              <a:schemeClr val="tx1"/>
+            </a:solidFill>
+          </a:ln>
+        </p:spPr>
+        <p:style>
+          <a:lnRef idx="1">
+            <a:schemeClr val="accent1"/>
+          </a:lnRef>
+          <a:fillRef idx="0">
+            <a:schemeClr val="accent1"/>
+          </a:fillRef>
+          <a:effectRef idx="0">
+            <a:schemeClr val="accent1"/>
+          </a:effectRef>
+          <a:fontRef idx="minor">
+            <a:schemeClr val="tx1"/>
+          </a:fontRef>
+        </p:style>
+      </p:cxnSp>
+      <p:sp>
+        <p:nvSpPr>
+          <p:cNvPr id="93" name="TextBox 92"/>
+          <p:cNvSpPr txBox="1"/>
+          <p:nvPr/>
+        </p:nvSpPr>
+        <p:spPr>
+          <a:xfrm>
+            <a:off x="6287490" y="5670729"/>
+            <a:ext cx="1296305" cy="369332"/>
+          </a:xfrm>
+          <a:prstGeom prst="rect">
+            <a:avLst/>
+          </a:prstGeom>
+          <a:noFill/>
+        </p:spPr>
+        <p:txBody>
+          <a:bodyPr wrap="square" rtlCol="0">
+            <a:spAutoFit/>
+          </a:bodyPr>
+          <a:lstStyle/>
+          <a:p>
+            <a:r>
+              <a:rPr lang="en-US" dirty="0" smtClean="0"/>
+              <a:t>name</a:t>
+            </a:r>
+            <a:endParaRPr lang="en-US" dirty="0"/>
+          </a:p>
+        </p:txBody>
+      </p:sp>
     </p:spTree>
     <p:extLst>
       <p:ext uri="{BB962C8B-B14F-4D97-AF65-F5344CB8AC3E}">

</xml_diff>